<commit_message>
Changed powerpoint trello page
</commit_message>
<xml_diff>
--- a/George Heimsath - IP Presentation.pptx
+++ b/George Heimsath - IP Presentation.pptx
@@ -129,371 +129,6 @@
 </p1510:revInfo>
 </file>
 
-<file path=ppt/changesInfos/changesInfo1.xml><?xml version="1.0" encoding="utf-8"?>
-<pc:chgInfo xmlns:a="http://schemas.openxmlformats.org/drawingml/2006/main" xmlns:r="http://schemas.openxmlformats.org/officeDocument/2006/relationships" xmlns:ac="http://schemas.microsoft.com/office/drawing/2013/main/command" xmlns:pc="http://schemas.microsoft.com/office/powerpoint/2013/main/command">
-  <pc:docChgLst>
-    <pc:chgData name="George Heimsath" userId="c98addbc195ccacf" providerId="Windows Live" clId="Web-{AAE12480-9B11-4D78-A486-87C65CADE697}"/>
-    <pc:docChg chg="addSld delSld modSld">
-      <pc:chgData name="George Heimsath" userId="c98addbc195ccacf" providerId="Windows Live" clId="Web-{AAE12480-9B11-4D78-A486-87C65CADE697}" dt="2019-03-11T01:45:58.645" v="291" actId="20577"/>
-      <pc:docMkLst>
-        <pc:docMk/>
-      </pc:docMkLst>
-      <pc:sldChg chg="addSp delSp modSp">
-        <pc:chgData name="George Heimsath" userId="c98addbc195ccacf" providerId="Windows Live" clId="Web-{AAE12480-9B11-4D78-A486-87C65CADE697}" dt="2019-03-11T01:44:12.864" v="269"/>
-        <pc:sldMkLst>
-          <pc:docMk/>
-          <pc:sldMk cId="109857222" sldId="256"/>
-        </pc:sldMkLst>
-        <pc:spChg chg="mod">
-          <ac:chgData name="George Heimsath" userId="c98addbc195ccacf" providerId="Windows Live" clId="Web-{AAE12480-9B11-4D78-A486-87C65CADE697}" dt="2019-03-11T01:38:53.312" v="213" actId="20577"/>
-          <ac:spMkLst>
-            <pc:docMk/>
-            <pc:sldMk cId="109857222" sldId="256"/>
-            <ac:spMk id="2" creationId="{00000000-0000-0000-0000-000000000000}"/>
-          </ac:spMkLst>
-        </pc:spChg>
-        <pc:spChg chg="mod">
-          <ac:chgData name="George Heimsath" userId="c98addbc195ccacf" providerId="Windows Live" clId="Web-{AAE12480-9B11-4D78-A486-87C65CADE697}" dt="2019-03-11T01:39:20.613" v="238" actId="20577"/>
-          <ac:spMkLst>
-            <pc:docMk/>
-            <pc:sldMk cId="109857222" sldId="256"/>
-            <ac:spMk id="3" creationId="{00000000-0000-0000-0000-000000000000}"/>
-          </ac:spMkLst>
-        </pc:spChg>
-        <pc:picChg chg="add del mod">
-          <ac:chgData name="George Heimsath" userId="c98addbc195ccacf" providerId="Windows Live" clId="Web-{AAE12480-9B11-4D78-A486-87C65CADE697}" dt="2019-03-11T01:44:12.864" v="269"/>
-          <ac:picMkLst>
-            <pc:docMk/>
-            <pc:sldMk cId="109857222" sldId="256"/>
-            <ac:picMk id="4" creationId="{597EF8EB-E1BC-48CA-91CF-29FBBEE3AA35}"/>
-          </ac:picMkLst>
-        </pc:picChg>
-      </pc:sldChg>
-      <pc:sldChg chg="addSp delSp modSp">
-        <pc:chgData name="George Heimsath" userId="c98addbc195ccacf" providerId="Windows Live" clId="Web-{AAE12480-9B11-4D78-A486-87C65CADE697}" dt="2019-03-11T01:43:16.349" v="264" actId="20577"/>
-        <pc:sldMkLst>
-          <pc:docMk/>
-          <pc:sldMk cId="853814256" sldId="257"/>
-        </pc:sldMkLst>
-        <pc:spChg chg="mod">
-          <ac:chgData name="George Heimsath" userId="c98addbc195ccacf" providerId="Windows Live" clId="Web-{AAE12480-9B11-4D78-A486-87C65CADE697}" dt="2019-03-11T01:43:16.349" v="264" actId="20577"/>
-          <ac:spMkLst>
-            <pc:docMk/>
-            <pc:sldMk cId="853814256" sldId="257"/>
-            <ac:spMk id="2" creationId="{5A1C4664-A13F-4089-BD86-12EDF5E066AB}"/>
-          </ac:spMkLst>
-        </pc:spChg>
-        <pc:spChg chg="del">
-          <ac:chgData name="George Heimsath" userId="c98addbc195ccacf" providerId="Windows Live" clId="Web-{AAE12480-9B11-4D78-A486-87C65CADE697}" dt="2019-03-11T01:36:35.549" v="195"/>
-          <ac:spMkLst>
-            <pc:docMk/>
-            <pc:sldMk cId="853814256" sldId="257"/>
-            <ac:spMk id="3" creationId="{ABCAA8E3-56A9-4645-932A-8B1BBD5CBDF3}"/>
-          </ac:spMkLst>
-        </pc:spChg>
-        <pc:picChg chg="add mod">
-          <ac:chgData name="George Heimsath" userId="c98addbc195ccacf" providerId="Windows Live" clId="Web-{AAE12480-9B11-4D78-A486-87C65CADE697}" dt="2019-03-11T01:37:39.579" v="200" actId="1076"/>
-          <ac:picMkLst>
-            <pc:docMk/>
-            <pc:sldMk cId="853814256" sldId="257"/>
-            <ac:picMk id="4" creationId="{51A7C89D-2EAA-4552-82DB-E17D64A91C9A}"/>
-          </ac:picMkLst>
-        </pc:picChg>
-      </pc:sldChg>
-      <pc:sldChg chg="modSp">
-        <pc:chgData name="George Heimsath" userId="c98addbc195ccacf" providerId="Windows Live" clId="Web-{AAE12480-9B11-4D78-A486-87C65CADE697}" dt="2019-03-11T01:20:33.206" v="126" actId="20577"/>
-        <pc:sldMkLst>
-          <pc:docMk/>
-          <pc:sldMk cId="2540386132" sldId="258"/>
-        </pc:sldMkLst>
-        <pc:spChg chg="mod">
-          <ac:chgData name="George Heimsath" userId="c98addbc195ccacf" providerId="Windows Live" clId="Web-{AAE12480-9B11-4D78-A486-87C65CADE697}" dt="2019-03-11T01:20:33.206" v="126" actId="20577"/>
-          <ac:spMkLst>
-            <pc:docMk/>
-            <pc:sldMk cId="2540386132" sldId="258"/>
-            <ac:spMk id="3" creationId="{16C4E943-96D6-43BA-A626-81B886220B8C}"/>
-          </ac:spMkLst>
-        </pc:spChg>
-      </pc:sldChg>
-      <pc:sldChg chg="addSp delSp modSp">
-        <pc:chgData name="George Heimsath" userId="c98addbc195ccacf" providerId="Windows Live" clId="Web-{AAE12480-9B11-4D78-A486-87C65CADE697}" dt="2019-03-10T20:33:05.168" v="38" actId="1076"/>
-        <pc:sldMkLst>
-          <pc:docMk/>
-          <pc:sldMk cId="184695485" sldId="259"/>
-        </pc:sldMkLst>
-        <pc:spChg chg="del">
-          <ac:chgData name="George Heimsath" userId="c98addbc195ccacf" providerId="Windows Live" clId="Web-{AAE12480-9B11-4D78-A486-87C65CADE697}" dt="2019-03-10T20:31:47.433" v="33"/>
-          <ac:spMkLst>
-            <pc:docMk/>
-            <pc:sldMk cId="184695485" sldId="259"/>
-            <ac:spMk id="3" creationId="{9B5DBA24-8B7D-4618-A523-83B7577A5C8F}"/>
-          </ac:spMkLst>
-        </pc:spChg>
-        <pc:picChg chg="add mod">
-          <ac:chgData name="George Heimsath" userId="c98addbc195ccacf" providerId="Windows Live" clId="Web-{AAE12480-9B11-4D78-A486-87C65CADE697}" dt="2019-03-10T20:33:05.168" v="38" actId="1076"/>
-          <ac:picMkLst>
-            <pc:docMk/>
-            <pc:sldMk cId="184695485" sldId="259"/>
-            <ac:picMk id="4" creationId="{2BB996EE-6C7C-41BF-980E-33C48F630803}"/>
-          </ac:picMkLst>
-        </pc:picChg>
-      </pc:sldChg>
-      <pc:sldChg chg="modSp">
-        <pc:chgData name="George Heimsath" userId="c98addbc195ccacf" providerId="Windows Live" clId="Web-{AAE12480-9B11-4D78-A486-87C65CADE697}" dt="2019-03-11T01:45:57.583" v="289" actId="20577"/>
-        <pc:sldMkLst>
-          <pc:docMk/>
-          <pc:sldMk cId="4192706243" sldId="260"/>
-        </pc:sldMkLst>
-        <pc:spChg chg="mod">
-          <ac:chgData name="George Heimsath" userId="c98addbc195ccacf" providerId="Windows Live" clId="Web-{AAE12480-9B11-4D78-A486-87C65CADE697}" dt="2019-03-11T01:45:57.583" v="289" actId="20577"/>
-          <ac:spMkLst>
-            <pc:docMk/>
-            <pc:sldMk cId="4192706243" sldId="260"/>
-            <ac:spMk id="3" creationId="{A85F73CF-137F-40D1-BACF-9460E27492B6}"/>
-          </ac:spMkLst>
-        </pc:spChg>
-      </pc:sldChg>
-      <pc:sldChg chg="addSp delSp modSp">
-        <pc:chgData name="George Heimsath" userId="c98addbc195ccacf" providerId="Windows Live" clId="Web-{AAE12480-9B11-4D78-A486-87C65CADE697}" dt="2019-03-11T01:24:43.629" v="193" actId="20577"/>
-        <pc:sldMkLst>
-          <pc:docMk/>
-          <pc:sldMk cId="1857504093" sldId="261"/>
-        </pc:sldMkLst>
-        <pc:spChg chg="mod">
-          <ac:chgData name="George Heimsath" userId="c98addbc195ccacf" providerId="Windows Live" clId="Web-{AAE12480-9B11-4D78-A486-87C65CADE697}" dt="2019-03-11T01:23:41.159" v="165" actId="20577"/>
-          <ac:spMkLst>
-            <pc:docMk/>
-            <pc:sldMk cId="1857504093" sldId="261"/>
-            <ac:spMk id="3" creationId="{986EEAB8-BD20-457E-887A-3950EADBF218}"/>
-          </ac:spMkLst>
-        </pc:spChg>
-        <pc:spChg chg="add mod">
-          <ac:chgData name="George Heimsath" userId="c98addbc195ccacf" providerId="Windows Live" clId="Web-{AAE12480-9B11-4D78-A486-87C65CADE697}" dt="2019-03-11T01:24:43.629" v="193" actId="20577"/>
-          <ac:spMkLst>
-            <pc:docMk/>
-            <pc:sldMk cId="1857504093" sldId="261"/>
-            <ac:spMk id="4" creationId="{4AFB55F3-76F1-4774-854B-9A14307364AE}"/>
-          </ac:spMkLst>
-        </pc:spChg>
-        <pc:spChg chg="add del">
-          <ac:chgData name="George Heimsath" userId="c98addbc195ccacf" providerId="Windows Live" clId="Web-{AAE12480-9B11-4D78-A486-87C65CADE697}" dt="2019-03-10T20:29:03.636" v="4"/>
-          <ac:spMkLst>
-            <pc:docMk/>
-            <pc:sldMk cId="1857504093" sldId="261"/>
-            <ac:spMk id="5" creationId="{BA801B92-782B-4884-942F-600E06FECA58}"/>
-          </ac:spMkLst>
-        </pc:spChg>
-      </pc:sldChg>
-      <pc:sldChg chg="modSp">
-        <pc:chgData name="George Heimsath" userId="c98addbc195ccacf" providerId="Windows Live" clId="Web-{AAE12480-9B11-4D78-A486-87C65CADE697}" dt="2019-03-10T20:39:03.216" v="105" actId="20577"/>
-        <pc:sldMkLst>
-          <pc:docMk/>
-          <pc:sldMk cId="2897797013" sldId="263"/>
-        </pc:sldMkLst>
-        <pc:spChg chg="mod">
-          <ac:chgData name="George Heimsath" userId="c98addbc195ccacf" providerId="Windows Live" clId="Web-{AAE12480-9B11-4D78-A486-87C65CADE697}" dt="2019-03-10T20:39:03.216" v="105" actId="20577"/>
-          <ac:spMkLst>
-            <pc:docMk/>
-            <pc:sldMk cId="2897797013" sldId="263"/>
-            <ac:spMk id="3" creationId="{B81F2609-B35D-4F57-BDB4-A36A5D5B5F69}"/>
-          </ac:spMkLst>
-        </pc:spChg>
-      </pc:sldChg>
-      <pc:sldChg chg="delSp modSp">
-        <pc:chgData name="George Heimsath" userId="c98addbc195ccacf" providerId="Windows Live" clId="Web-{AAE12480-9B11-4D78-A486-87C65CADE697}" dt="2019-03-10T20:40:26.654" v="119" actId="14100"/>
-        <pc:sldMkLst>
-          <pc:docMk/>
-          <pc:sldMk cId="888156108" sldId="264"/>
-        </pc:sldMkLst>
-        <pc:spChg chg="mod">
-          <ac:chgData name="George Heimsath" userId="c98addbc195ccacf" providerId="Windows Live" clId="Web-{AAE12480-9B11-4D78-A486-87C65CADE697}" dt="2019-03-10T20:40:26.654" v="119" actId="14100"/>
-          <ac:spMkLst>
-            <pc:docMk/>
-            <pc:sldMk cId="888156108" sldId="264"/>
-            <ac:spMk id="2" creationId="{40FDA855-512D-452F-9BE1-C68E42BA9444}"/>
-          </ac:spMkLst>
-        </pc:spChg>
-        <pc:spChg chg="del">
-          <ac:chgData name="George Heimsath" userId="c98addbc195ccacf" providerId="Windows Live" clId="Web-{AAE12480-9B11-4D78-A486-87C65CADE697}" dt="2019-03-10T20:39:12.278" v="107"/>
-          <ac:spMkLst>
-            <pc:docMk/>
-            <pc:sldMk cId="888156108" sldId="264"/>
-            <ac:spMk id="3" creationId="{E705D48D-DAD6-4C4D-8263-7F8003CA65BB}"/>
-          </ac:spMkLst>
-        </pc:spChg>
-      </pc:sldChg>
-      <pc:sldChg chg="new del">
-        <pc:chgData name="George Heimsath" userId="c98addbc195ccacf" providerId="Windows Live" clId="Web-{AAE12480-9B11-4D78-A486-87C65CADE697}" dt="2019-03-11T01:44:38.848" v="271"/>
-        <pc:sldMkLst>
-          <pc:docMk/>
-          <pc:sldMk cId="495878401" sldId="265"/>
-        </pc:sldMkLst>
-      </pc:sldChg>
-      <pc:sldChg chg="add">
-        <pc:chgData name="George Heimsath" userId="c98addbc195ccacf" providerId="Windows Live" clId="Web-{AAE12480-9B11-4D78-A486-87C65CADE697}" dt="2019-03-11T01:44:32.114" v="270"/>
-        <pc:sldMkLst>
-          <pc:docMk/>
-          <pc:sldMk cId="2099211569" sldId="266"/>
-        </pc:sldMkLst>
-      </pc:sldChg>
-    </pc:docChg>
-  </pc:docChgLst>
-  <pc:docChgLst>
-    <pc:chgData name="George Heimsath" userId="c98addbc195ccacf" providerId="Windows Live" clId="Web-{A9065AC2-E69A-40E8-A32B-DCB8BC9D1C54}"/>
-    <pc:docChg chg="addSld delSld modSld sldOrd">
-      <pc:chgData name="George Heimsath" userId="c98addbc195ccacf" providerId="Windows Live" clId="Web-{A9065AC2-E69A-40E8-A32B-DCB8BC9D1C54}" dt="2019-03-10T20:25:49.028" v="48" actId="1076"/>
-      <pc:docMkLst>
-        <pc:docMk/>
-      </pc:docMkLst>
-      <pc:sldChg chg="modSp new">
-        <pc:chgData name="George Heimsath" userId="c98addbc195ccacf" providerId="Windows Live" clId="Web-{A9065AC2-E69A-40E8-A32B-DCB8BC9D1C54}" dt="2019-03-10T20:20:42.636" v="1" actId="20577"/>
-        <pc:sldMkLst>
-          <pc:docMk/>
-          <pc:sldMk cId="853814256" sldId="257"/>
-        </pc:sldMkLst>
-        <pc:spChg chg="mod">
-          <ac:chgData name="George Heimsath" userId="c98addbc195ccacf" providerId="Windows Live" clId="Web-{A9065AC2-E69A-40E8-A32B-DCB8BC9D1C54}" dt="2019-03-10T20:20:42.636" v="1" actId="20577"/>
-          <ac:spMkLst>
-            <pc:docMk/>
-            <pc:sldMk cId="853814256" sldId="257"/>
-            <ac:spMk id="2" creationId="{5A1C4664-A13F-4089-BD86-12EDF5E066AB}"/>
-          </ac:spMkLst>
-        </pc:spChg>
-      </pc:sldChg>
-      <pc:sldChg chg="modSp new">
-        <pc:chgData name="George Heimsath" userId="c98addbc195ccacf" providerId="Windows Live" clId="Web-{A9065AC2-E69A-40E8-A32B-DCB8BC9D1C54}" dt="2019-03-10T20:21:22.714" v="6" actId="20577"/>
-        <pc:sldMkLst>
-          <pc:docMk/>
-          <pc:sldMk cId="2540386132" sldId="258"/>
-        </pc:sldMkLst>
-        <pc:spChg chg="mod">
-          <ac:chgData name="George Heimsath" userId="c98addbc195ccacf" providerId="Windows Live" clId="Web-{A9065AC2-E69A-40E8-A32B-DCB8BC9D1C54}" dt="2019-03-10T20:21:22.714" v="6" actId="20577"/>
-          <ac:spMkLst>
-            <pc:docMk/>
-            <pc:sldMk cId="2540386132" sldId="258"/>
-            <ac:spMk id="2" creationId="{8A9F0208-D209-4E6F-A5C8-FA63C8BBBA7D}"/>
-          </ac:spMkLst>
-        </pc:spChg>
-      </pc:sldChg>
-      <pc:sldChg chg="modSp new">
-        <pc:chgData name="George Heimsath" userId="c98addbc195ccacf" providerId="Windows Live" clId="Web-{A9065AC2-E69A-40E8-A32B-DCB8BC9D1C54}" dt="2019-03-10T20:21:31.215" v="9" actId="20577"/>
-        <pc:sldMkLst>
-          <pc:docMk/>
-          <pc:sldMk cId="184695485" sldId="259"/>
-        </pc:sldMkLst>
-        <pc:spChg chg="mod">
-          <ac:chgData name="George Heimsath" userId="c98addbc195ccacf" providerId="Windows Live" clId="Web-{A9065AC2-E69A-40E8-A32B-DCB8BC9D1C54}" dt="2019-03-10T20:21:31.215" v="9" actId="20577"/>
-          <ac:spMkLst>
-            <pc:docMk/>
-            <pc:sldMk cId="184695485" sldId="259"/>
-            <ac:spMk id="2" creationId="{7F04F8A7-F2DB-48A8-B598-450804BFDB9C}"/>
-          </ac:spMkLst>
-        </pc:spChg>
-      </pc:sldChg>
-      <pc:sldChg chg="modSp new ord">
-        <pc:chgData name="George Heimsath" userId="c98addbc195ccacf" providerId="Windows Live" clId="Web-{A9065AC2-E69A-40E8-A32B-DCB8BC9D1C54}" dt="2019-03-10T20:25:07.762" v="39" actId="20577"/>
-        <pc:sldMkLst>
-          <pc:docMk/>
-          <pc:sldMk cId="4192706243" sldId="260"/>
-        </pc:sldMkLst>
-        <pc:spChg chg="mod">
-          <ac:chgData name="George Heimsath" userId="c98addbc195ccacf" providerId="Windows Live" clId="Web-{A9065AC2-E69A-40E8-A32B-DCB8BC9D1C54}" dt="2019-03-10T20:22:32.965" v="16" actId="20577"/>
-          <ac:spMkLst>
-            <pc:docMk/>
-            <pc:sldMk cId="4192706243" sldId="260"/>
-            <ac:spMk id="2" creationId="{3EBB128A-A1A6-4F4F-B9E4-7ED59BAC8207}"/>
-          </ac:spMkLst>
-        </pc:spChg>
-        <pc:spChg chg="mod">
-          <ac:chgData name="George Heimsath" userId="c98addbc195ccacf" providerId="Windows Live" clId="Web-{A9065AC2-E69A-40E8-A32B-DCB8BC9D1C54}" dt="2019-03-10T20:25:07.762" v="39" actId="20577"/>
-          <ac:spMkLst>
-            <pc:docMk/>
-            <pc:sldMk cId="4192706243" sldId="260"/>
-            <ac:spMk id="3" creationId="{A85F73CF-137F-40D1-BACF-9460E27492B6}"/>
-          </ac:spMkLst>
-        </pc:spChg>
-      </pc:sldChg>
-      <pc:sldChg chg="modSp new">
-        <pc:chgData name="George Heimsath" userId="c98addbc195ccacf" providerId="Windows Live" clId="Web-{A9065AC2-E69A-40E8-A32B-DCB8BC9D1C54}" dt="2019-03-10T20:25:49.028" v="48" actId="1076"/>
-        <pc:sldMkLst>
-          <pc:docMk/>
-          <pc:sldMk cId="1857504093" sldId="261"/>
-        </pc:sldMkLst>
-        <pc:spChg chg="mod">
-          <ac:chgData name="George Heimsath" userId="c98addbc195ccacf" providerId="Windows Live" clId="Web-{A9065AC2-E69A-40E8-A32B-DCB8BC9D1C54}" dt="2019-03-10T20:25:10.731" v="43" actId="20577"/>
-          <ac:spMkLst>
-            <pc:docMk/>
-            <pc:sldMk cId="1857504093" sldId="261"/>
-            <ac:spMk id="2" creationId="{89854D9B-A3FE-4D7F-A774-F10C6917B6A2}"/>
-          </ac:spMkLst>
-        </pc:spChg>
-        <pc:spChg chg="mod">
-          <ac:chgData name="George Heimsath" userId="c98addbc195ccacf" providerId="Windows Live" clId="Web-{A9065AC2-E69A-40E8-A32B-DCB8BC9D1C54}" dt="2019-03-10T20:25:49.028" v="48" actId="1076"/>
-          <ac:spMkLst>
-            <pc:docMk/>
-            <pc:sldMk cId="1857504093" sldId="261"/>
-            <ac:spMk id="3" creationId="{986EEAB8-BD20-457E-887A-3950EADBF218}"/>
-          </ac:spMkLst>
-        </pc:spChg>
-      </pc:sldChg>
-      <pc:sldChg chg="modSp new del">
-        <pc:chgData name="George Heimsath" userId="c98addbc195ccacf" providerId="Windows Live" clId="Web-{A9065AC2-E69A-40E8-A32B-DCB8BC9D1C54}" dt="2019-03-10T20:25:10.809" v="45"/>
-        <pc:sldMkLst>
-          <pc:docMk/>
-          <pc:sldMk cId="48985234" sldId="262"/>
-        </pc:sldMkLst>
-        <pc:spChg chg="mod">
-          <ac:chgData name="George Heimsath" userId="c98addbc195ccacf" providerId="Windows Live" clId="Web-{A9065AC2-E69A-40E8-A32B-DCB8BC9D1C54}" dt="2019-03-10T20:23:00.418" v="23" actId="20577"/>
-          <ac:spMkLst>
-            <pc:docMk/>
-            <pc:sldMk cId="48985234" sldId="262"/>
-            <ac:spMk id="2" creationId="{F38976C4-BF00-463B-B809-D0D44D702D13}"/>
-          </ac:spMkLst>
-        </pc:spChg>
-        <pc:spChg chg="mod">
-          <ac:chgData name="George Heimsath" userId="c98addbc195ccacf" providerId="Windows Live" clId="Web-{A9065AC2-E69A-40E8-A32B-DCB8BC9D1C54}" dt="2019-03-10T20:25:07.809" v="41" actId="20577"/>
-          <ac:spMkLst>
-            <pc:docMk/>
-            <pc:sldMk cId="48985234" sldId="262"/>
-            <ac:spMk id="3" creationId="{D476785D-5DF8-42F9-8207-E7B2C1A05B11}"/>
-          </ac:spMkLst>
-        </pc:spChg>
-      </pc:sldChg>
-      <pc:sldChg chg="modSp new">
-        <pc:chgData name="George Heimsath" userId="c98addbc195ccacf" providerId="Windows Live" clId="Web-{A9065AC2-E69A-40E8-A32B-DCB8BC9D1C54}" dt="2019-03-10T20:24:36.294" v="26" actId="20577"/>
-        <pc:sldMkLst>
-          <pc:docMk/>
-          <pc:sldMk cId="2897797013" sldId="263"/>
-        </pc:sldMkLst>
-        <pc:spChg chg="mod">
-          <ac:chgData name="George Heimsath" userId="c98addbc195ccacf" providerId="Windows Live" clId="Web-{A9065AC2-E69A-40E8-A32B-DCB8BC9D1C54}" dt="2019-03-10T20:24:36.294" v="26" actId="20577"/>
-          <ac:spMkLst>
-            <pc:docMk/>
-            <pc:sldMk cId="2897797013" sldId="263"/>
-            <ac:spMk id="2" creationId="{34D3F5CC-6738-45EC-8045-479738791EE4}"/>
-          </ac:spMkLst>
-        </pc:spChg>
-      </pc:sldChg>
-      <pc:sldChg chg="modSp new">
-        <pc:chgData name="George Heimsath" userId="c98addbc195ccacf" providerId="Windows Live" clId="Web-{A9065AC2-E69A-40E8-A32B-DCB8BC9D1C54}" dt="2019-03-10T20:24:36.403" v="29" actId="20577"/>
-        <pc:sldMkLst>
-          <pc:docMk/>
-          <pc:sldMk cId="888156108" sldId="264"/>
-        </pc:sldMkLst>
-        <pc:spChg chg="mod">
-          <ac:chgData name="George Heimsath" userId="c98addbc195ccacf" providerId="Windows Live" clId="Web-{A9065AC2-E69A-40E8-A32B-DCB8BC9D1C54}" dt="2019-03-10T20:24:36.403" v="29" actId="20577"/>
-          <ac:spMkLst>
-            <pc:docMk/>
-            <pc:sldMk cId="888156108" sldId="264"/>
-            <ac:spMk id="2" creationId="{40FDA855-512D-452F-9BE1-C68E42BA9444}"/>
-          </ac:spMkLst>
-        </pc:spChg>
-      </pc:sldChg>
-    </pc:docChg>
-  </pc:docChgLst>
-</pc:chgInfo>
-</file>
-
 <file path=ppt/slideLayouts/slideLayout1.xml><?xml version="1.0" encoding="utf-8"?>
 <p:sldLayout xmlns:a="http://schemas.openxmlformats.org/drawingml/2006/main" xmlns:r="http://schemas.openxmlformats.org/officeDocument/2006/relationships" xmlns:p="http://schemas.openxmlformats.org/presentationml/2006/main" type="title" preserve="1">
   <p:cSld name="Title Slide">
@@ -625,7 +260,7 @@
           <a:p>
             <a:fld id="{846CE7D5-CF57-46EF-B807-FDD0502418D4}" type="datetimeFigureOut">
               <a:rPr lang="en-GB" smtClean="0"/>
-              <a:t>10/03/2019</a:t>
+              <a:t>11/03/2019</a:t>
             </a:fld>
             <a:endParaRPr lang="en-GB"/>
           </a:p>
@@ -795,7 +430,7 @@
           <a:p>
             <a:fld id="{846CE7D5-CF57-46EF-B807-FDD0502418D4}" type="datetimeFigureOut">
               <a:rPr lang="en-GB" smtClean="0"/>
-              <a:t>10/03/2019</a:t>
+              <a:t>11/03/2019</a:t>
             </a:fld>
             <a:endParaRPr lang="en-GB"/>
           </a:p>
@@ -975,7 +610,7 @@
           <a:p>
             <a:fld id="{846CE7D5-CF57-46EF-B807-FDD0502418D4}" type="datetimeFigureOut">
               <a:rPr lang="en-GB" smtClean="0"/>
-              <a:t>10/03/2019</a:t>
+              <a:t>11/03/2019</a:t>
             </a:fld>
             <a:endParaRPr lang="en-GB"/>
           </a:p>
@@ -1145,7 +780,7 @@
           <a:p>
             <a:fld id="{846CE7D5-CF57-46EF-B807-FDD0502418D4}" type="datetimeFigureOut">
               <a:rPr lang="en-GB" smtClean="0"/>
-              <a:t>10/03/2019</a:t>
+              <a:t>11/03/2019</a:t>
             </a:fld>
             <a:endParaRPr lang="en-GB"/>
           </a:p>
@@ -1391,7 +1026,7 @@
           <a:p>
             <a:fld id="{846CE7D5-CF57-46EF-B807-FDD0502418D4}" type="datetimeFigureOut">
               <a:rPr lang="en-GB" smtClean="0"/>
-              <a:t>10/03/2019</a:t>
+              <a:t>11/03/2019</a:t>
             </a:fld>
             <a:endParaRPr lang="en-GB"/>
           </a:p>
@@ -1623,7 +1258,7 @@
           <a:p>
             <a:fld id="{846CE7D5-CF57-46EF-B807-FDD0502418D4}" type="datetimeFigureOut">
               <a:rPr lang="en-GB" smtClean="0"/>
-              <a:t>10/03/2019</a:t>
+              <a:t>11/03/2019</a:t>
             </a:fld>
             <a:endParaRPr lang="en-GB"/>
           </a:p>
@@ -1990,7 +1625,7 @@
           <a:p>
             <a:fld id="{846CE7D5-CF57-46EF-B807-FDD0502418D4}" type="datetimeFigureOut">
               <a:rPr lang="en-GB" smtClean="0"/>
-              <a:t>10/03/2019</a:t>
+              <a:t>11/03/2019</a:t>
             </a:fld>
             <a:endParaRPr lang="en-GB"/>
           </a:p>
@@ -2108,7 +1743,7 @@
           <a:p>
             <a:fld id="{846CE7D5-CF57-46EF-B807-FDD0502418D4}" type="datetimeFigureOut">
               <a:rPr lang="en-GB" smtClean="0"/>
-              <a:t>10/03/2019</a:t>
+              <a:t>11/03/2019</a:t>
             </a:fld>
             <a:endParaRPr lang="en-GB"/>
           </a:p>
@@ -2203,7 +1838,7 @@
           <a:p>
             <a:fld id="{846CE7D5-CF57-46EF-B807-FDD0502418D4}" type="datetimeFigureOut">
               <a:rPr lang="en-GB" smtClean="0"/>
-              <a:t>10/03/2019</a:t>
+              <a:t>11/03/2019</a:t>
             </a:fld>
             <a:endParaRPr lang="en-GB"/>
           </a:p>
@@ -2480,7 +2115,7 @@
           <a:p>
             <a:fld id="{846CE7D5-CF57-46EF-B807-FDD0502418D4}" type="datetimeFigureOut">
               <a:rPr lang="en-GB" smtClean="0"/>
-              <a:t>10/03/2019</a:t>
+              <a:t>11/03/2019</a:t>
             </a:fld>
             <a:endParaRPr lang="en-GB"/>
           </a:p>
@@ -2737,7 +2372,7 @@
           <a:p>
             <a:fld id="{846CE7D5-CF57-46EF-B807-FDD0502418D4}" type="datetimeFigureOut">
               <a:rPr lang="en-GB" smtClean="0"/>
-              <a:t>10/03/2019</a:t>
+              <a:t>11/03/2019</a:t>
             </a:fld>
             <a:endParaRPr lang="en-GB"/>
           </a:p>
@@ -2950,7 +2585,7 @@
           <a:p>
             <a:fld id="{846CE7D5-CF57-46EF-B807-FDD0502418D4}" type="datetimeFigureOut">
               <a:rPr lang="en-GB" smtClean="0"/>
-              <a:t>10/03/2019</a:t>
+              <a:t>11/03/2019</a:t>
             </a:fld>
             <a:endParaRPr lang="en-GB"/>
           </a:p>
@@ -3927,10 +3562,10 @@
       </p:sp>
       <p:pic>
         <p:nvPicPr>
-          <p:cNvPr id="4" name="Picture 4" descr="A screenshot of a cell phone&#10;&#10;Description generated with very high confidence">
+          <p:cNvPr id="3" name="Picture 4" descr="A screenshot of a cell phone&#10;&#10;Description generated with very high confidence">
             <a:extLst>
               <a:ext uri="{FF2B5EF4-FFF2-40B4-BE49-F238E27FC236}">
-                <a16:creationId xmlns:a16="http://schemas.microsoft.com/office/drawing/2014/main" id="{2BB996EE-6C7C-41BF-980E-33C48F630803}"/>
+                <a16:creationId xmlns:a16="http://schemas.microsoft.com/office/drawing/2014/main" id="{AB083302-1403-42EC-B5DF-56EA489A0C08}"/>
               </a:ext>
             </a:extLst>
           </p:cNvPr>
@@ -3947,8 +3582,8 @@
         </p:blipFill>
         <p:spPr>
           <a:xfrm>
-            <a:off x="2923309" y="312574"/>
-            <a:ext cx="6345381" cy="6302122"/>
+            <a:off x="2884450" y="165309"/>
+            <a:ext cx="6423101" cy="6527381"/>
           </a:xfrm>
           <a:prstGeom prst="rect">
             <a:avLst/>

</xml_diff>